<commit_message>
finalize the project with documents
</commit_message>
<xml_diff>
--- a/documents/Group 7 Library Application Presentation.pptx
+++ b/documents/Group 7 Library Application Presentation.pptx
@@ -5,7 +5,7 @@
     <p:sldMasterId id="2147483739" r:id="rId1"/>
   </p:sldMasterIdLst>
   <p:notesMasterIdLst>
-    <p:notesMasterId r:id="rId18"/>
+    <p:notesMasterId r:id="rId19"/>
   </p:notesMasterIdLst>
   <p:sldIdLst>
     <p:sldId id="256" r:id="rId2"/>
@@ -20,10 +20,11 @@
     <p:sldId id="267" r:id="rId11"/>
     <p:sldId id="268" r:id="rId12"/>
     <p:sldId id="269" r:id="rId13"/>
-    <p:sldId id="270" r:id="rId14"/>
-    <p:sldId id="262" r:id="rId15"/>
-    <p:sldId id="263" r:id="rId16"/>
-    <p:sldId id="264" r:id="rId17"/>
+    <p:sldId id="272" r:id="rId14"/>
+    <p:sldId id="270" r:id="rId15"/>
+    <p:sldId id="262" r:id="rId16"/>
+    <p:sldId id="263" r:id="rId17"/>
+    <p:sldId id="264" r:id="rId18"/>
   </p:sldIdLst>
   <p:sldSz cx="12192000" cy="6858000"/>
   <p:notesSz cx="6858000" cy="9144000"/>
@@ -212,7 +213,7 @@
           <a:p>
             <a:fld id="{B59E37F5-7850-4AD9-B5A3-5A00D5589004}" type="datetimeFigureOut">
               <a:rPr lang="en-US" smtClean="0"/>
-              <a:t>9/14/2024</a:t>
+              <a:t>9/15/2024</a:t>
             </a:fld>
             <a:endParaRPr lang="en-US"/>
           </a:p>
@@ -544,7 +545,7 @@
           <a:p>
             <a:fld id="{3570B872-D048-48F0-B6CE-3044DDEB1A82}" type="slidenum">
               <a:rPr lang="en-US" smtClean="0"/>
-              <a:t>14</a:t>
+              <a:t>15</a:t>
             </a:fld>
             <a:endParaRPr lang="en-US"/>
           </a:p>
@@ -2910,7 +2911,7 @@
           <a:p>
             <a:fld id="{3C04E684-10F4-4CC3-A0B9-F03AA7BE37CF}" type="datetimeFigureOut">
               <a:rPr lang="en-US" smtClean="0"/>
-              <a:t>9/14/2024</a:t>
+              <a:t>9/15/2024</a:t>
             </a:fld>
             <a:endParaRPr lang="en-US"/>
           </a:p>
@@ -5400,7 +5401,7 @@
           <a:p>
             <a:fld id="{3C04E684-10F4-4CC3-A0B9-F03AA7BE37CF}" type="datetimeFigureOut">
               <a:rPr lang="en-US" smtClean="0"/>
-              <a:t>9/14/2024</a:t>
+              <a:t>9/15/2024</a:t>
             </a:fld>
             <a:endParaRPr lang="en-US"/>
           </a:p>
@@ -5598,7 +5599,7 @@
           <a:p>
             <a:fld id="{3C04E684-10F4-4CC3-A0B9-F03AA7BE37CF}" type="datetimeFigureOut">
               <a:rPr lang="en-US" smtClean="0"/>
-              <a:t>9/14/2024</a:t>
+              <a:t>9/15/2024</a:t>
             </a:fld>
             <a:endParaRPr lang="en-US"/>
           </a:p>
@@ -5806,7 +5807,7 @@
           <a:p>
             <a:fld id="{3C04E684-10F4-4CC3-A0B9-F03AA7BE37CF}" type="datetimeFigureOut">
               <a:rPr lang="en-US" smtClean="0"/>
-              <a:t>9/14/2024</a:t>
+              <a:t>9/15/2024</a:t>
             </a:fld>
             <a:endParaRPr lang="en-US"/>
           </a:p>
@@ -6543,7 +6544,7 @@
           <a:p>
             <a:fld id="{3C04E684-10F4-4CC3-A0B9-F03AA7BE37CF}" type="datetimeFigureOut">
               <a:rPr lang="en-US" smtClean="0"/>
-              <a:t>9/14/2024</a:t>
+              <a:t>9/15/2024</a:t>
             </a:fld>
             <a:endParaRPr lang="en-US"/>
           </a:p>
@@ -7185,7 +7186,7 @@
           <a:p>
             <a:fld id="{3C04E684-10F4-4CC3-A0B9-F03AA7BE37CF}" type="datetimeFigureOut">
               <a:rPr lang="en-US" smtClean="0"/>
-              <a:t>9/14/2024</a:t>
+              <a:t>9/15/2024</a:t>
             </a:fld>
             <a:endParaRPr lang="en-US"/>
           </a:p>
@@ -7985,7 +7986,7 @@
           <a:p>
             <a:fld id="{3C04E684-10F4-4CC3-A0B9-F03AA7BE37CF}" type="datetimeFigureOut">
               <a:rPr lang="en-US" smtClean="0"/>
-              <a:t>9/14/2024</a:t>
+              <a:t>9/15/2024</a:t>
             </a:fld>
             <a:endParaRPr lang="en-US"/>
           </a:p>
@@ -8936,7 +8937,7 @@
           <a:p>
             <a:fld id="{3C04E684-10F4-4CC3-A0B9-F03AA7BE37CF}" type="datetimeFigureOut">
               <a:rPr lang="en-US" smtClean="0"/>
-              <a:t>9/14/2024</a:t>
+              <a:t>9/15/2024</a:t>
             </a:fld>
             <a:endParaRPr lang="en-US"/>
           </a:p>
@@ -11285,7 +11286,7 @@
           <a:p>
             <a:fld id="{3C04E684-10F4-4CC3-A0B9-F03AA7BE37CF}" type="datetimeFigureOut">
               <a:rPr lang="en-US" smtClean="0"/>
-              <a:t>9/14/2024</a:t>
+              <a:t>9/15/2024</a:t>
             </a:fld>
             <a:endParaRPr lang="en-US"/>
           </a:p>
@@ -11398,7 +11399,7 @@
           <a:p>
             <a:fld id="{3C04E684-10F4-4CC3-A0B9-F03AA7BE37CF}" type="datetimeFigureOut">
               <a:rPr lang="en-US" smtClean="0"/>
-              <a:t>9/14/2024</a:t>
+              <a:t>9/15/2024</a:t>
             </a:fld>
             <a:endParaRPr lang="en-US"/>
           </a:p>
@@ -11905,7 +11906,7 @@
           <a:p>
             <a:fld id="{3C04E684-10F4-4CC3-A0B9-F03AA7BE37CF}" type="datetimeFigureOut">
               <a:rPr lang="en-US" smtClean="0"/>
-              <a:t>9/14/2024</a:t>
+              <a:t>9/15/2024</a:t>
             </a:fld>
             <a:endParaRPr lang="en-US"/>
           </a:p>
@@ -13208,7 +13209,7 @@
           <a:p>
             <a:fld id="{3C04E684-10F4-4CC3-A0B9-F03AA7BE37CF}" type="datetimeFigureOut">
               <a:rPr lang="en-US" smtClean="0"/>
-              <a:t>9/14/2024</a:t>
+              <a:t>9/15/2024</a:t>
             </a:fld>
             <a:endParaRPr lang="en-US"/>
           </a:p>
@@ -13455,7 +13456,7 @@
           <a:p>
             <a:fld id="{3C04E684-10F4-4CC3-A0B9-F03AA7BE37CF}" type="datetimeFigureOut">
               <a:rPr lang="en-US" smtClean="0"/>
-              <a:t>9/14/2024</a:t>
+              <a:t>9/15/2024</a:t>
             </a:fld>
             <a:endParaRPr lang="en-US"/>
           </a:p>
@@ -14624,7 +14625,7 @@
           <a:p>
             <a:r>
               <a:rPr lang="en-US" dirty="0"/>
-              <a:t>Member Id is required and not existed</a:t>
+              <a:t>Member Id is required and must be existed</a:t>
             </a:r>
           </a:p>
           <a:p>
@@ -14842,7 +14843,7 @@
           <a:p>
             <a:r>
               <a:rPr lang="en-US" dirty="0"/>
-              <a:t>Member id is required and existed</a:t>
+              <a:t>Member id is required and must be existed</a:t>
             </a:r>
           </a:p>
           <a:p>
@@ -14870,7 +14871,7 @@
             </a:r>
             <a:r>
               <a:rPr lang="en-US" dirty="0"/>
-              <a:t> is existed and available to checkout (has a copy is available)</a:t>
+              <a:t> must be existed and available to checkout (has a copy is available)</a:t>
             </a:r>
           </a:p>
         </p:txBody>
@@ -14910,6 +14911,116 @@
           <p:cNvPr id="2" name="Title 1">
             <a:extLst>
               <a:ext uri="{FF2B5EF4-FFF2-40B4-BE49-F238E27FC236}">
+                <a16:creationId xmlns:a16="http://schemas.microsoft.com/office/drawing/2014/main" id="{7D5DE943-A66A-2CC8-D688-486B87D673E5}"/>
+              </a:ext>
+            </a:extLst>
+          </p:cNvPr>
+          <p:cNvSpPr>
+            <a:spLocks noGrp="1"/>
+          </p:cNvSpPr>
+          <p:nvPr>
+            <p:ph type="title"/>
+          </p:nvPr>
+        </p:nvSpPr>
+        <p:spPr/>
+        <p:txBody>
+          <a:bodyPr/>
+          <a:lstStyle/>
+          <a:p>
+            <a:r>
+              <a:rPr lang="en-US" dirty="0"/>
+              <a:t>Validation rules – New author dialog</a:t>
+            </a:r>
+          </a:p>
+        </p:txBody>
+      </p:sp>
+      <p:sp>
+        <p:nvSpPr>
+          <p:cNvPr id="3" name="Content Placeholder 2">
+            <a:extLst>
+              <a:ext uri="{FF2B5EF4-FFF2-40B4-BE49-F238E27FC236}">
+                <a16:creationId xmlns:a16="http://schemas.microsoft.com/office/drawing/2014/main" id="{44B8A3AF-D0FB-5727-215A-EC5E87CAFA60}"/>
+              </a:ext>
+            </a:extLst>
+          </p:cNvPr>
+          <p:cNvSpPr>
+            <a:spLocks noGrp="1"/>
+          </p:cNvSpPr>
+          <p:nvPr>
+            <p:ph idx="1"/>
+          </p:nvPr>
+        </p:nvSpPr>
+        <p:spPr/>
+        <p:txBody>
+          <a:bodyPr/>
+          <a:lstStyle/>
+          <a:p>
+            <a:r>
+              <a:rPr lang="en-US" dirty="0"/>
+              <a:t>First name and last name are required</a:t>
+            </a:r>
+          </a:p>
+          <a:p>
+            <a:r>
+              <a:rPr lang="en-US" dirty="0"/>
+              <a:t>Telephone is required and valid “\d{3}-\d{3}-\d{4}”</a:t>
+            </a:r>
+          </a:p>
+          <a:p>
+            <a:r>
+              <a:rPr lang="en-US" dirty="0"/>
+              <a:t>Short bio is optional</a:t>
+            </a:r>
+          </a:p>
+          <a:p>
+            <a:r>
+              <a:rPr lang="en-US" dirty="0"/>
+              <a:t>Street, city, and state are required</a:t>
+            </a:r>
+          </a:p>
+          <a:p>
+            <a:r>
+              <a:rPr lang="en-US" dirty="0"/>
+              <a:t>Zip is required and numeric</a:t>
+            </a:r>
+          </a:p>
+        </p:txBody>
+      </p:sp>
+    </p:spTree>
+    <p:extLst>
+      <p:ext uri="{BB962C8B-B14F-4D97-AF65-F5344CB8AC3E}">
+        <p14:creationId xmlns:p14="http://schemas.microsoft.com/office/powerpoint/2010/main" val="1825277400"/>
+      </p:ext>
+    </p:extLst>
+  </p:cSld>
+  <p:clrMapOvr>
+    <a:masterClrMapping/>
+  </p:clrMapOvr>
+</p:sld>
+</file>
+
+<file path=ppt/slides/slide14.xml><?xml version="1.0" encoding="utf-8"?>
+<p:sld xmlns:a="http://schemas.openxmlformats.org/drawingml/2006/main" xmlns:r="http://schemas.openxmlformats.org/officeDocument/2006/relationships" xmlns:p="http://schemas.openxmlformats.org/presentationml/2006/main">
+  <p:cSld>
+    <p:spTree>
+      <p:nvGrpSpPr>
+        <p:cNvPr id="1" name=""/>
+        <p:cNvGrpSpPr/>
+        <p:nvPr/>
+      </p:nvGrpSpPr>
+      <p:grpSpPr>
+        <a:xfrm>
+          <a:off x="0" y="0"/>
+          <a:ext cx="0" cy="0"/>
+          <a:chOff x="0" y="0"/>
+          <a:chExt cx="0" cy="0"/>
+        </a:xfrm>
+      </p:grpSpPr>
+      <p:sp>
+        <p:nvSpPr>
+          <p:cNvPr id="2" name="Title 1">
+            <a:extLst>
+              <a:ext uri="{FF2B5EF4-FFF2-40B4-BE49-F238E27FC236}">
                 <a16:creationId xmlns:a16="http://schemas.microsoft.com/office/drawing/2014/main" id="{E74D6E2E-3163-5E1C-458B-3BBC14B28CF8}"/>
               </a:ext>
             </a:extLst>
@@ -14951,10 +15062,21 @@
         </p:nvSpPr>
         <p:spPr/>
         <p:txBody>
-          <a:bodyPr/>
+          <a:bodyPr>
+            <a:normAutofit fontScale="62500" lnSpcReduction="20000"/>
+          </a:bodyPr>
           <a:lstStyle/>
           <a:p>
-            <a:endParaRPr lang="en-US" dirty="0"/>
+            <a:r>
+              <a:rPr lang="en-US" dirty="0"/>
+              <a:t>In the library system, everything works in an orderly and structured way. The library has books and members. A member only could borrow/checkout a book if it was available…Similarly, the consciousness in STC principle, at its most fundamental level, embodies orderliness and coherence. The same as the library system requires clear rules and structured data to operate properly, the Science and Technology of Consciousness emphasizes that the mind, when in a state of relaxed awareness (as achieved through practicing Transcendental Meditation), naturally aligns with universal principles of order. This alignment enables one to manage their thoughts and actions more effectively, similar to the way a library system manages its resources.</a:t>
+            </a:r>
+          </a:p>
+          <a:p>
+            <a:r>
+              <a:rPr lang="en-US" dirty="0"/>
+              <a:t>The process of checking out a book to a library member represents the interaction and connection between different components of the system. In STC, this can be compared to the concept of the Unified Field, where all aspects of life are interconnected at a fundamental level of pure consciousness. When a member checks out a book, it affects the availability of the book and the member’s borrowing history. Similarly, STC suggests that our consciousness is part of a unified field, where every thought and action resonates throughout the whole system of consciousness, impacting individual and group experience.</a:t>
+            </a:r>
           </a:p>
         </p:txBody>
       </p:sp>
@@ -14971,7 +15093,7 @@
 </p:sld>
 </file>
 
-<file path=ppt/slides/slide14.xml><?xml version="1.0" encoding="utf-8"?>
+<file path=ppt/slides/slide15.xml><?xml version="1.0" encoding="utf-8"?>
 <p:sld xmlns:a="http://schemas.openxmlformats.org/drawingml/2006/main" xmlns:r="http://schemas.openxmlformats.org/officeDocument/2006/relationships" xmlns:p="http://schemas.openxmlformats.org/presentationml/2006/main">
   <p:cSld>
     <p:spTree>
@@ -15059,14 +15181,13 @@
           </a:p>
           <a:p>
             <a:r>
-              <a:rPr lang="en-US" dirty="0"/>
-              <a:t>Branch</a:t>
+              <a:rPr lang="en-US"/>
+              <a:t>Git branch</a:t>
             </a:r>
             <a:r>
-              <a:rPr lang="en-US"/>
+              <a:rPr lang="en-US" dirty="0"/>
               <a:t>: master</a:t>
             </a:r>
-            <a:endParaRPr lang="en-US" dirty="0"/>
           </a:p>
           <a:p>
             <a:endParaRPr lang="en-US" dirty="0"/>
@@ -15086,7 +15207,7 @@
 </p:sld>
 </file>
 
-<file path=ppt/slides/slide15.xml><?xml version="1.0" encoding="utf-8"?>
+<file path=ppt/slides/slide16.xml><?xml version="1.0" encoding="utf-8"?>
 <p:sld xmlns:a="http://schemas.openxmlformats.org/drawingml/2006/main" xmlns:r="http://schemas.openxmlformats.org/officeDocument/2006/relationships" xmlns:p="http://schemas.openxmlformats.org/presentationml/2006/main">
   <p:cSld>
     <p:spTree>
@@ -15230,7 +15351,7 @@
 </p:sld>
 </file>
 
-<file path=ppt/slides/slide16.xml><?xml version="1.0" encoding="utf-8"?>
+<file path=ppt/slides/slide17.xml><?xml version="1.0" encoding="utf-8"?>
 <p:sld xmlns:a="http://schemas.openxmlformats.org/drawingml/2006/main" xmlns:r="http://schemas.openxmlformats.org/officeDocument/2006/relationships" xmlns:p="http://schemas.openxmlformats.org/presentationml/2006/main">
   <p:cSld>
     <p:spTree>
@@ -15542,8 +15663,8 @@
         </p:blipFill>
         <p:spPr>
           <a:xfrm>
-            <a:off x="2033170" y="2011363"/>
-            <a:ext cx="8125660" cy="4160837"/>
+            <a:off x="1460794" y="2011363"/>
+            <a:ext cx="9464952" cy="4846637"/>
           </a:xfrm>
         </p:spPr>
       </p:pic>
@@ -15605,31 +15726,41 @@
           </a:p>
         </p:txBody>
       </p:sp>
-      <p:sp>
-        <p:nvSpPr>
-          <p:cNvPr id="3" name="Content Placeholder 2">
+      <p:pic>
+        <p:nvPicPr>
+          <p:cNvPr id="5" name="Content Placeholder 4" descr="A diagram of a company&#10;&#10;Description automatically generated">
             <a:extLst>
               <a:ext uri="{FF2B5EF4-FFF2-40B4-BE49-F238E27FC236}">
-                <a16:creationId xmlns:a16="http://schemas.microsoft.com/office/drawing/2014/main" id="{C12866AF-05ED-EE2F-0292-C15524AA16FF}"/>
+                <a16:creationId xmlns:a16="http://schemas.microsoft.com/office/drawing/2014/main" id="{3E89A38E-E363-9048-0BE0-A7E1036EC9D7}"/>
               </a:ext>
             </a:extLst>
           </p:cNvPr>
-          <p:cNvSpPr>
-            <a:spLocks noGrp="1"/>
-          </p:cNvSpPr>
+          <p:cNvPicPr>
+            <a:picLocks noGrp="1" noChangeAspect="1"/>
+          </p:cNvPicPr>
           <p:nvPr>
             <p:ph idx="1"/>
           </p:nvPr>
-        </p:nvSpPr>
-        <p:spPr/>
-        <p:txBody>
-          <a:bodyPr/>
-          <a:lstStyle/>
-          <a:p>
-            <a:endParaRPr lang="en-US"/>
-          </a:p>
-        </p:txBody>
-      </p:sp>
+        </p:nvPicPr>
+        <p:blipFill>
+          <a:blip r:embed="rId2">
+            <a:extLst>
+              <a:ext uri="{28A0092B-C50C-407E-A947-70E740481C1C}">
+                <a14:useLocalDpi xmlns:a14="http://schemas.microsoft.com/office/drawing/2010/main" val="0"/>
+              </a:ext>
+            </a:extLst>
+          </a:blip>
+          <a:stretch>
+            <a:fillRect/>
+          </a:stretch>
+        </p:blipFill>
+        <p:spPr>
+          <a:xfrm>
+            <a:off x="2278064" y="1389716"/>
+            <a:ext cx="7635872" cy="5692459"/>
+          </a:xfrm>
+        </p:spPr>
+      </p:pic>
     </p:spTree>
     <p:extLst>
       <p:ext uri="{BB962C8B-B14F-4D97-AF65-F5344CB8AC3E}">
@@ -15723,7 +15854,7 @@
         </p:blipFill>
         <p:spPr>
           <a:xfrm>
-            <a:off x="3344933" y="1280778"/>
+            <a:off x="3344933" y="1310273"/>
             <a:ext cx="5766695" cy="5680140"/>
           </a:xfrm>
         </p:spPr>
@@ -15816,7 +15947,7 @@
         </p:blipFill>
         <p:spPr>
           <a:xfrm>
-            <a:off x="2543284" y="1254243"/>
+            <a:off x="2543284" y="1389920"/>
             <a:ext cx="7105431" cy="5812324"/>
           </a:xfrm>
         </p:spPr>
@@ -15909,7 +16040,7 @@
         </p:blipFill>
         <p:spPr>
           <a:xfrm>
-            <a:off x="2613415" y="1245865"/>
+            <a:off x="2613415" y="1316653"/>
             <a:ext cx="7207845" cy="5693251"/>
           </a:xfrm>
         </p:spPr>
@@ -15995,13 +16126,19 @@
           <a:p>
             <a:r>
               <a:rPr lang="en-US" dirty="0"/>
-              <a:t>Username is required</a:t>
+              <a:t>Username and Password are required</a:t>
             </a:r>
           </a:p>
           <a:p>
             <a:r>
               <a:rPr lang="en-US" dirty="0"/>
-              <a:t>Password is required</a:t>
+              <a:t>Username must be existed</a:t>
+            </a:r>
+          </a:p>
+          <a:p>
+            <a:r>
+              <a:rPr lang="en-US" dirty="0"/>
+              <a:t>Password must be correct</a:t>
             </a:r>
           </a:p>
         </p:txBody>
@@ -16115,7 +16252,7 @@
             </a:r>
             <a:r>
               <a:rPr lang="en-US" dirty="0"/>
-              <a:t> is not existed</a:t>
+              <a:t> must be existed</a:t>
             </a:r>
           </a:p>
           <a:p>
@@ -16127,7 +16264,7 @@
           <a:p>
             <a:r>
               <a:rPr lang="en-US" dirty="0"/>
-              <a:t>Max checkout length is in range [1,21]</a:t>
+              <a:t>Max checkout length must be in range [1,21]</a:t>
             </a:r>
           </a:p>
           <a:p>

</xml_diff>